<commit_message>
Update chapter {chapter} - {title}
</commit_message>
<xml_diff>
--- a/09 - Persisting Data/slides.pptx
+++ b/09 - Persisting Data/slides.pptx
@@ -562,7 +562,7 @@
   <pc:docChgLst>
     <pc:chgData name="Riccardo Berta" userId="c8694f89-bba4-4576-b0a8-456619ca5a8c" providerId="ADAL" clId="{C2A3F98E-1757-7245-99EC-903D3FFCEC31}"/>
     <pc:docChg chg="undo custSel addSld delSld modSld sldOrd">
-      <pc:chgData name="Riccardo Berta" userId="c8694f89-bba4-4576-b0a8-456619ca5a8c" providerId="ADAL" clId="{C2A3F98E-1757-7245-99EC-903D3FFCEC31}" dt="2025-05-21T11:54:45.870" v="203" actId="1076"/>
+      <pc:chgData name="Riccardo Berta" userId="c8694f89-bba4-4576-b0a8-456619ca5a8c" providerId="ADAL" clId="{C2A3F98E-1757-7245-99EC-903D3FFCEC31}" dt="2025-05-30T12:56:02.846" v="204" actId="20577"/>
       <pc:docMkLst>
         <pc:docMk/>
       </pc:docMkLst>
@@ -619,12 +619,20 @@
           </ac:picMkLst>
         </pc:picChg>
       </pc:sldChg>
-      <pc:sldChg chg="delSp mod">
-        <pc:chgData name="Riccardo Berta" userId="c8694f89-bba4-4576-b0a8-456619ca5a8c" providerId="ADAL" clId="{C2A3F98E-1757-7245-99EC-903D3FFCEC31}" dt="2025-05-19T11:32:25.410" v="25" actId="478"/>
+      <pc:sldChg chg="delSp modSp mod">
+        <pc:chgData name="Riccardo Berta" userId="c8694f89-bba4-4576-b0a8-456619ca5a8c" providerId="ADAL" clId="{C2A3F98E-1757-7245-99EC-903D3FFCEC31}" dt="2025-05-30T12:56:02.846" v="204" actId="20577"/>
         <pc:sldMkLst>
           <pc:docMk/>
           <pc:sldMk cId="0" sldId="259"/>
         </pc:sldMkLst>
+        <pc:spChg chg="mod">
+          <ac:chgData name="Riccardo Berta" userId="c8694f89-bba4-4576-b0a8-456619ca5a8c" providerId="ADAL" clId="{C2A3F98E-1757-7245-99EC-903D3FFCEC31}" dt="2025-05-30T12:56:02.846" v="204" actId="20577"/>
+          <ac:spMkLst>
+            <pc:docMk/>
+            <pc:sldMk cId="0" sldId="259"/>
+            <ac:spMk id="100" creationId="{00000000-0000-0000-0000-000000000000}"/>
+          </ac:spMkLst>
+        </pc:spChg>
       </pc:sldChg>
       <pc:sldChg chg="delSp mod">
         <pc:chgData name="Riccardo Berta" userId="c8694f89-bba4-4576-b0a8-456619ca5a8c" providerId="ADAL" clId="{C2A3F98E-1757-7245-99EC-903D3FFCEC31}" dt="2025-05-19T11:32:28.136" v="26" actId="478"/>
@@ -726,14 +734,6 @@
             <ac:picMk id="2" creationId="{D9CEEF59-247A-BC19-20FA-9C5613DAD3AD}"/>
           </ac:picMkLst>
         </pc:picChg>
-        <pc:picChg chg="del">
-          <ac:chgData name="Riccardo Berta" userId="c8694f89-bba4-4576-b0a8-456619ca5a8c" providerId="ADAL" clId="{C2A3F98E-1757-7245-99EC-903D3FFCEC31}" dt="2025-05-21T11:48:46.172" v="192" actId="478"/>
-          <ac:picMkLst>
-            <pc:docMk/>
-            <pc:sldMk cId="0" sldId="271"/>
-            <ac:picMk id="190" creationId="{00000000-0000-0000-0000-000000000000}"/>
-          </ac:picMkLst>
-        </pc:picChg>
       </pc:sldChg>
       <pc:sldChg chg="delSp mod">
         <pc:chgData name="Riccardo Berta" userId="c8694f89-bba4-4576-b0a8-456619ca5a8c" providerId="ADAL" clId="{C2A3F98E-1757-7245-99EC-903D3FFCEC31}" dt="2025-05-19T11:33:09.975" v="41" actId="478"/>
@@ -763,110 +763,6 @@
           <pc:docMk/>
           <pc:sldMk cId="0" sldId="275"/>
         </pc:sldMkLst>
-        <pc:spChg chg="del">
-          <ac:chgData name="Riccardo Berta" userId="c8694f89-bba4-4576-b0a8-456619ca5a8c" providerId="ADAL" clId="{C2A3F98E-1757-7245-99EC-903D3FFCEC31}" dt="2025-05-21T11:52:55.144" v="198" actId="478"/>
-          <ac:spMkLst>
-            <pc:docMk/>
-            <pc:sldMk cId="0" sldId="275"/>
-            <ac:spMk id="221" creationId="{00000000-0000-0000-0000-000000000000}"/>
-          </ac:spMkLst>
-        </pc:spChg>
-        <pc:spChg chg="del">
-          <ac:chgData name="Riccardo Berta" userId="c8694f89-bba4-4576-b0a8-456619ca5a8c" providerId="ADAL" clId="{C2A3F98E-1757-7245-99EC-903D3FFCEC31}" dt="2025-05-21T11:52:55.144" v="198" actId="478"/>
-          <ac:spMkLst>
-            <pc:docMk/>
-            <pc:sldMk cId="0" sldId="275"/>
-            <ac:spMk id="226" creationId="{00000000-0000-0000-0000-000000000000}"/>
-          </ac:spMkLst>
-        </pc:spChg>
-        <pc:spChg chg="del">
-          <ac:chgData name="Riccardo Berta" userId="c8694f89-bba4-4576-b0a8-456619ca5a8c" providerId="ADAL" clId="{C2A3F98E-1757-7245-99EC-903D3FFCEC31}" dt="2025-05-21T11:52:55.144" v="198" actId="478"/>
-          <ac:spMkLst>
-            <pc:docMk/>
-            <pc:sldMk cId="0" sldId="275"/>
-            <ac:spMk id="227" creationId="{00000000-0000-0000-0000-000000000000}"/>
-          </ac:spMkLst>
-        </pc:spChg>
-        <pc:spChg chg="del">
-          <ac:chgData name="Riccardo Berta" userId="c8694f89-bba4-4576-b0a8-456619ca5a8c" providerId="ADAL" clId="{C2A3F98E-1757-7245-99EC-903D3FFCEC31}" dt="2025-05-21T11:52:55.144" v="198" actId="478"/>
-          <ac:spMkLst>
-            <pc:docMk/>
-            <pc:sldMk cId="0" sldId="275"/>
-            <ac:spMk id="229" creationId="{00000000-0000-0000-0000-000000000000}"/>
-          </ac:spMkLst>
-        </pc:spChg>
-        <pc:spChg chg="del">
-          <ac:chgData name="Riccardo Berta" userId="c8694f89-bba4-4576-b0a8-456619ca5a8c" providerId="ADAL" clId="{C2A3F98E-1757-7245-99EC-903D3FFCEC31}" dt="2025-05-21T11:52:55.144" v="198" actId="478"/>
-          <ac:spMkLst>
-            <pc:docMk/>
-            <pc:sldMk cId="0" sldId="275"/>
-            <ac:spMk id="231" creationId="{00000000-0000-0000-0000-000000000000}"/>
-          </ac:spMkLst>
-        </pc:spChg>
-        <pc:spChg chg="del">
-          <ac:chgData name="Riccardo Berta" userId="c8694f89-bba4-4576-b0a8-456619ca5a8c" providerId="ADAL" clId="{C2A3F98E-1757-7245-99EC-903D3FFCEC31}" dt="2025-05-21T11:52:55.144" v="198" actId="478"/>
-          <ac:spMkLst>
-            <pc:docMk/>
-            <pc:sldMk cId="0" sldId="275"/>
-            <ac:spMk id="234" creationId="{00000000-0000-0000-0000-000000000000}"/>
-          </ac:spMkLst>
-        </pc:spChg>
-        <pc:spChg chg="del">
-          <ac:chgData name="Riccardo Berta" userId="c8694f89-bba4-4576-b0a8-456619ca5a8c" providerId="ADAL" clId="{C2A3F98E-1757-7245-99EC-903D3FFCEC31}" dt="2025-05-21T11:52:58.998" v="199" actId="478"/>
-          <ac:spMkLst>
-            <pc:docMk/>
-            <pc:sldMk cId="0" sldId="275"/>
-            <ac:spMk id="243" creationId="{00000000-0000-0000-0000-000000000000}"/>
-          </ac:spMkLst>
-        </pc:spChg>
-        <pc:spChg chg="del">
-          <ac:chgData name="Riccardo Berta" userId="c8694f89-bba4-4576-b0a8-456619ca5a8c" providerId="ADAL" clId="{C2A3F98E-1757-7245-99EC-903D3FFCEC31}" dt="2025-05-21T11:52:55.144" v="198" actId="478"/>
-          <ac:spMkLst>
-            <pc:docMk/>
-            <pc:sldMk cId="0" sldId="275"/>
-            <ac:spMk id="244" creationId="{00000000-0000-0000-0000-000000000000}"/>
-          </ac:spMkLst>
-        </pc:spChg>
-        <pc:spChg chg="del">
-          <ac:chgData name="Riccardo Berta" userId="c8694f89-bba4-4576-b0a8-456619ca5a8c" providerId="ADAL" clId="{C2A3F98E-1757-7245-99EC-903D3FFCEC31}" dt="2025-05-21T11:52:55.144" v="198" actId="478"/>
-          <ac:spMkLst>
-            <pc:docMk/>
-            <pc:sldMk cId="0" sldId="275"/>
-            <ac:spMk id="258" creationId="{00000000-0000-0000-0000-000000000000}"/>
-          </ac:spMkLst>
-        </pc:spChg>
-        <pc:spChg chg="del">
-          <ac:chgData name="Riccardo Berta" userId="c8694f89-bba4-4576-b0a8-456619ca5a8c" providerId="ADAL" clId="{C2A3F98E-1757-7245-99EC-903D3FFCEC31}" dt="2025-05-21T11:52:55.144" v="198" actId="478"/>
-          <ac:spMkLst>
-            <pc:docMk/>
-            <pc:sldMk cId="0" sldId="275"/>
-            <ac:spMk id="259" creationId="{00000000-0000-0000-0000-000000000000}"/>
-          </ac:spMkLst>
-        </pc:spChg>
-        <pc:spChg chg="del">
-          <ac:chgData name="Riccardo Berta" userId="c8694f89-bba4-4576-b0a8-456619ca5a8c" providerId="ADAL" clId="{C2A3F98E-1757-7245-99EC-903D3FFCEC31}" dt="2025-05-21T11:52:55.144" v="198" actId="478"/>
-          <ac:spMkLst>
-            <pc:docMk/>
-            <pc:sldMk cId="0" sldId="275"/>
-            <ac:spMk id="262" creationId="{00000000-0000-0000-0000-000000000000}"/>
-          </ac:spMkLst>
-        </pc:spChg>
-        <pc:spChg chg="del">
-          <ac:chgData name="Riccardo Berta" userId="c8694f89-bba4-4576-b0a8-456619ca5a8c" providerId="ADAL" clId="{C2A3F98E-1757-7245-99EC-903D3FFCEC31}" dt="2025-05-21T11:52:58.998" v="199" actId="478"/>
-          <ac:spMkLst>
-            <pc:docMk/>
-            <pc:sldMk cId="0" sldId="275"/>
-            <ac:spMk id="275" creationId="{00000000-0000-0000-0000-000000000000}"/>
-          </ac:spMkLst>
-        </pc:spChg>
-        <pc:spChg chg="del">
-          <ac:chgData name="Riccardo Berta" userId="c8694f89-bba4-4576-b0a8-456619ca5a8c" providerId="ADAL" clId="{C2A3F98E-1757-7245-99EC-903D3FFCEC31}" dt="2025-05-21T11:52:58.998" v="199" actId="478"/>
-          <ac:spMkLst>
-            <pc:docMk/>
-            <pc:sldMk cId="0" sldId="275"/>
-            <ac:spMk id="278" creationId="{00000000-0000-0000-0000-000000000000}"/>
-          </ac:spMkLst>
-        </pc:spChg>
         <pc:picChg chg="add mod">
           <ac:chgData name="Riccardo Berta" userId="c8694f89-bba4-4576-b0a8-456619ca5a8c" providerId="ADAL" clId="{C2A3F98E-1757-7245-99EC-903D3FFCEC31}" dt="2025-05-21T11:54:45.870" v="203" actId="1076"/>
           <ac:picMkLst>
@@ -875,14 +771,6 @@
             <ac:picMk id="2" creationId="{24269095-D570-C41B-138B-EB727F93722A}"/>
           </ac:picMkLst>
         </pc:picChg>
-        <pc:cxnChg chg="del mod">
-          <ac:chgData name="Riccardo Berta" userId="c8694f89-bba4-4576-b0a8-456619ca5a8c" providerId="ADAL" clId="{C2A3F98E-1757-7245-99EC-903D3FFCEC31}" dt="2025-05-21T11:52:58.998" v="199" actId="478"/>
-          <ac:cxnSpMkLst>
-            <pc:docMk/>
-            <pc:sldMk cId="0" sldId="275"/>
-            <ac:cxnSpMk id="279" creationId="{00000000-0000-0000-0000-000000000000}"/>
-          </ac:cxnSpMkLst>
-        </pc:cxnChg>
       </pc:sldChg>
       <pc:sldChg chg="del">
         <pc:chgData name="Riccardo Berta" userId="c8694f89-bba4-4576-b0a8-456619ca5a8c" providerId="ADAL" clId="{C2A3F98E-1757-7245-99EC-903D3FFCEC31}" dt="2025-05-20T14:52:45.752" v="187" actId="2696"/>
@@ -17105,22 +16993,13 @@
               <a:t>or </a:t>
             </a:r>
             <a:r>
-              <a:rPr lang="en-GB" dirty="0" err="1">
-                <a:latin typeface="Courier New"/>
-                <a:ea typeface="Courier New"/>
-                <a:cs typeface="Courier New"/>
-                <a:sym typeface="Courier New"/>
-              </a:rPr>
-              <a:t>db.stats</a:t>
-            </a:r>
-            <a:r>
-              <a:rPr lang="en-GB" dirty="0">
-                <a:latin typeface="Courier New"/>
-                <a:ea typeface="Courier New"/>
-                <a:cs typeface="Courier New"/>
-                <a:sym typeface="Courier New"/>
-              </a:rPr>
-              <a:t>()</a:t>
+              <a:rPr lang="it-IT">
+                <a:latin typeface="Courier New"/>
+                <a:ea typeface="Courier New"/>
+                <a:cs typeface="Courier New"/>
+                <a:sym typeface="Courier New"/>
+              </a:rPr>
+              <a:t>	</a:t>
             </a:r>
             <a:endParaRPr dirty="0">
               <a:latin typeface="Courier New"/>
@@ -21009,6 +20888,15 @@
 </file>
 
 <file path=customXml/item1.xml><?xml version="1.0" encoding="utf-8"?>
+<?mso-contentType ?>
+<FormTemplates xmlns="http://schemas.microsoft.com/sharepoint/v3/contenttype/forms">
+  <Display>DocumentLibraryForm</Display>
+  <Edit>DocumentLibraryForm</Edit>
+  <New>DocumentLibraryForm</New>
+</FormTemplates>
+</file>
+
+<file path=customXml/item2.xml><?xml version="1.0" encoding="utf-8"?>
 <p:properties xmlns:p="http://schemas.microsoft.com/office/2006/metadata/properties" xmlns:xsi="http://www.w3.org/2001/XMLSchema-instance" xmlns:pc="http://schemas.microsoft.com/office/infopath/2007/PartnerControls">
   <documentManagement>
     <TaxCatchAll xmlns="e9b5433c-2372-4cb7-8bab-09518096b29b" xsi:nil="true"/>
@@ -21017,15 +20905,6 @@
     </lcf76f155ced4ddcb4097134ff3c332f>
   </documentManagement>
 </p:properties>
-</file>
-
-<file path=customXml/item2.xml><?xml version="1.0" encoding="utf-8"?>
-<?mso-contentType ?>
-<FormTemplates xmlns="http://schemas.microsoft.com/sharepoint/v3/contenttype/forms">
-  <Display>DocumentLibraryForm</Display>
-  <Edit>DocumentLibraryForm</Edit>
-  <New>DocumentLibraryForm</New>
-</FormTemplates>
 </file>
 
 <file path=customXml/item3.xml><?xml version="1.0" encoding="utf-8"?>
@@ -21236,26 +21115,26 @@
 </file>
 
 <file path=customXml/itemProps1.xml><?xml version="1.0" encoding="utf-8"?>
-<ds:datastoreItem xmlns:ds="http://schemas.openxmlformats.org/officeDocument/2006/customXml" ds:itemID="{10716466-962F-46DA-9921-2BD92E633557}">
+<ds:datastoreItem xmlns:ds="http://schemas.openxmlformats.org/officeDocument/2006/customXml" ds:itemID="{9D701534-58DE-430C-8C7E-64F63CAC4C07}">
   <ds:schemaRefs>
-    <ds:schemaRef ds:uri="http://purl.org/dc/terms/"/>
-    <ds:schemaRef ds:uri="3bd0d43f-5e5b-43cd-b6fc-691bd77672c6"/>
-    <ds:schemaRef ds:uri="http://purl.org/dc/elements/1.1/"/>
-    <ds:schemaRef ds:uri="http://schemas.microsoft.com/office/infopath/2007/PartnerControls"/>
-    <ds:schemaRef ds:uri="http://schemas.microsoft.com/office/2006/documentManagement/types"/>
-    <ds:schemaRef ds:uri="http://www.w3.org/XML/1998/namespace"/>
-    <ds:schemaRef ds:uri="http://schemas.microsoft.com/office/2006/metadata/properties"/>
-    <ds:schemaRef ds:uri="http://schemas.openxmlformats.org/package/2006/metadata/core-properties"/>
-    <ds:schemaRef ds:uri="e9b5433c-2372-4cb7-8bab-09518096b29b"/>
-    <ds:schemaRef ds:uri="http://purl.org/dc/dcmitype/"/>
+    <ds:schemaRef ds:uri="http://schemas.microsoft.com/sharepoint/v3/contenttype/forms"/>
   </ds:schemaRefs>
 </ds:datastoreItem>
 </file>
 
 <file path=customXml/itemProps2.xml><?xml version="1.0" encoding="utf-8"?>
-<ds:datastoreItem xmlns:ds="http://schemas.openxmlformats.org/officeDocument/2006/customXml" ds:itemID="{9D701534-58DE-430C-8C7E-64F63CAC4C07}">
+<ds:datastoreItem xmlns:ds="http://schemas.openxmlformats.org/officeDocument/2006/customXml" ds:itemID="{10716466-962F-46DA-9921-2BD92E633557}">
   <ds:schemaRefs>
-    <ds:schemaRef ds:uri="http://schemas.microsoft.com/sharepoint/v3/contenttype/forms"/>
+    <ds:schemaRef ds:uri="http://purl.org/dc/terms/"/>
+    <ds:schemaRef ds:uri="http://purl.org/dc/elements/1.1/"/>
+    <ds:schemaRef ds:uri="http://www.w3.org/XML/1998/namespace"/>
+    <ds:schemaRef ds:uri="http://purl.org/dc/dcmitype/"/>
+    <ds:schemaRef ds:uri="http://schemas.microsoft.com/office/2006/documentManagement/types"/>
+    <ds:schemaRef ds:uri="http://schemas.microsoft.com/office/infopath/2007/PartnerControls"/>
+    <ds:schemaRef ds:uri="3bd0d43f-5e5b-43cd-b6fc-691bd77672c6"/>
+    <ds:schemaRef ds:uri="http://schemas.openxmlformats.org/package/2006/metadata/core-properties"/>
+    <ds:schemaRef ds:uri="e9b5433c-2372-4cb7-8bab-09518096b29b"/>
+    <ds:schemaRef ds:uri="http://schemas.microsoft.com/office/2006/metadata/properties"/>
   </ds:schemaRefs>
 </ds:datastoreItem>
 </file>

</xml_diff>